<commit_message>
Updating images and Pres Slides
</commit_message>
<xml_diff>
--- a/Final_Project_Slides_Draft2.pptx
+++ b/Final_Project_Slides_Draft2.pptx
@@ -9,8 +9,9 @@
     <p:sldId id="305" r:id="rId6"/>
     <p:sldId id="301" r:id="rId7"/>
     <p:sldId id="302" r:id="rId8"/>
-    <p:sldId id="303" r:id="rId9"/>
-    <p:sldId id="304" r:id="rId10"/>
+    <p:sldId id="306" r:id="rId9"/>
+    <p:sldId id="303" r:id="rId10"/>
+    <p:sldId id="304" r:id="rId11"/>
   </p:sldIdLst>
   <p:sldSz cx="12192000" cy="6858000"/>
   <p:notesSz cx="6858000" cy="9144000"/>
@@ -4766,7 +4767,7 @@
           <a:p>
             <a:r>
               <a:rPr lang="en-US" dirty="0"/>
-              <a:t>Data Exploration</a:t>
+              <a:t>Technologies Used</a:t>
             </a:r>
           </a:p>
         </p:txBody>
@@ -4787,14 +4788,612 @@
             <p:ph idx="1"/>
             <p:extLst>
               <p:ext uri="{D42A27DB-BD31-4B8C-83A1-F6EECF244321}">
-                <p14:modId xmlns:p14="http://schemas.microsoft.com/office/powerpoint/2010/main" val="1064702613"/>
+                <p14:modId xmlns:p14="http://schemas.microsoft.com/office/powerpoint/2010/main" val="1012649752"/>
               </p:ext>
             </p:extLst>
           </p:nvPr>
         </p:nvGraphicFramePr>
         <p:xfrm>
           <a:off x="223934" y="1284894"/>
-          <a:ext cx="11756571" cy="4563966"/>
+          <a:ext cx="11756571" cy="5600286"/>
+        </p:xfrm>
+        <a:graphic>
+          <a:graphicData uri="http://schemas.openxmlformats.org/drawingml/2006/table">
+            <a:tbl>
+              <a:tblPr firstRow="1" bandRow="1">
+                <a:noFill/>
+                <a:tableStyleId>{3B4B98B0-60AC-42C2-AFA5-B58CD77FA1E5}</a:tableStyleId>
+              </a:tblPr>
+              <a:tblGrid>
+                <a:gridCol w="11756571">
+                  <a:extLst>
+                    <a:ext uri="{9D8B030D-6E8A-4147-A177-3AD203B41FA5}">
+                      <a16:colId xmlns:a16="http://schemas.microsoft.com/office/drawing/2014/main" val="2981917977"/>
+                    </a:ext>
+                  </a:extLst>
+                </a:gridCol>
+              </a:tblGrid>
+              <a:tr h="585899">
+                <a:tc>
+                  <a:txBody>
+                    <a:bodyPr/>
+                    <a:lstStyle/>
+                    <a:p>
+                      <a:endParaRPr lang="en-US" sz="2400" b="0" cap="all" spc="150" dirty="0">
+                        <a:solidFill>
+                          <a:schemeClr val="lt1"/>
+                        </a:solidFill>
+                      </a:endParaRPr>
+                    </a:p>
+                  </a:txBody>
+                  <a:tcPr marL="151061" marR="151061" marT="151061" marB="151061">
+                    <a:lnL w="12700" cmpd="sng">
+                      <a:noFill/>
+                    </a:lnL>
+                    <a:lnR w="12700" cmpd="sng">
+                      <a:noFill/>
+                    </a:lnR>
+                    <a:lnT w="12700" cmpd="sng">
+                      <a:noFill/>
+                    </a:lnT>
+                    <a:lnB w="38100" cmpd="sng">
+                      <a:noFill/>
+                    </a:lnB>
+                    <a:solidFill>
+                      <a:schemeClr val="accent1"/>
+                    </a:solidFill>
+                  </a:tcPr>
+                </a:tc>
+                <a:extLst>
+                  <a:ext uri="{0D108BD9-81ED-4DB2-BD59-A6C34878D82A}">
+                    <a16:rowId xmlns:a16="http://schemas.microsoft.com/office/drawing/2014/main" val="2580512675"/>
+                  </a:ext>
+                </a:extLst>
+              </a:tr>
+              <a:tr h="2912151">
+                <a:tc>
+                  <a:txBody>
+                    <a:bodyPr/>
+                    <a:lstStyle/>
+                    <a:p>
+                      <a:pPr marL="285750" indent="-285750">
+                        <a:buFont typeface="Wingdings" panose="05000000000000000000" pitchFamily="2" charset="2"/>
+                        <a:buChar char="Ø"/>
+                      </a:pPr>
+                      <a:r>
+                        <a:rPr lang="en-US" sz="1800" b="0" i="0" kern="1200" dirty="0">
+                          <a:solidFill>
+                            <a:schemeClr val="tx1"/>
+                          </a:solidFill>
+                          <a:effectLst/>
+                          <a:latin typeface="+mn-lt"/>
+                          <a:ea typeface="+mn-ea"/>
+                          <a:cs typeface="+mn-cs"/>
+                        </a:rPr>
+                        <a:t>Python</a:t>
+                      </a:r>
+                    </a:p>
+                    <a:p>
+                      <a:pPr marL="285750" indent="-285750">
+                        <a:buFont typeface="Wingdings" panose="05000000000000000000" pitchFamily="2" charset="2"/>
+                        <a:buChar char="Ø"/>
+                      </a:pPr>
+                      <a:endParaRPr lang="en-US" sz="1800" b="0" i="0" kern="1200" dirty="0">
+                        <a:solidFill>
+                          <a:schemeClr val="tx1"/>
+                        </a:solidFill>
+                        <a:effectLst/>
+                        <a:latin typeface="+mn-lt"/>
+                        <a:ea typeface="+mn-ea"/>
+                        <a:cs typeface="+mn-cs"/>
+                      </a:endParaRPr>
+                    </a:p>
+                    <a:p>
+                      <a:pPr marL="285750" indent="-285750">
+                        <a:buFont typeface="Wingdings" panose="05000000000000000000" pitchFamily="2" charset="2"/>
+                        <a:buChar char="Ø"/>
+                      </a:pPr>
+                      <a:endParaRPr lang="en-US" sz="1800" b="0" i="0" kern="1200" dirty="0">
+                        <a:solidFill>
+                          <a:schemeClr val="tx1"/>
+                        </a:solidFill>
+                        <a:effectLst/>
+                        <a:latin typeface="+mn-lt"/>
+                        <a:ea typeface="+mn-ea"/>
+                        <a:cs typeface="+mn-cs"/>
+                      </a:endParaRPr>
+                    </a:p>
+                    <a:p>
+                      <a:pPr marL="285750" indent="-285750">
+                        <a:buFont typeface="Wingdings" panose="05000000000000000000" pitchFamily="2" charset="2"/>
+                        <a:buChar char="Ø"/>
+                      </a:pPr>
+                      <a:r>
+                        <a:rPr lang="en-US" sz="1800" b="0" i="0" kern="1200" dirty="0">
+                          <a:solidFill>
+                            <a:schemeClr val="tx1"/>
+                          </a:solidFill>
+                          <a:effectLst/>
+                          <a:latin typeface="+mn-lt"/>
+                          <a:ea typeface="+mn-ea"/>
+                          <a:cs typeface="+mn-cs"/>
+                        </a:rPr>
+                        <a:t>Supervised Machine Learning -  Logistical Regression(Oversampling), Decision Trees, Random Forest Classification</a:t>
+                      </a:r>
+                    </a:p>
+                    <a:p>
+                      <a:pPr marL="285750" indent="-285750">
+                        <a:buFont typeface="Wingdings" panose="05000000000000000000" pitchFamily="2" charset="2"/>
+                        <a:buChar char="Ø"/>
+                      </a:pPr>
+                      <a:endParaRPr lang="en-US" sz="1800" b="0" i="0" kern="1200" dirty="0">
+                        <a:solidFill>
+                          <a:schemeClr val="tx1"/>
+                        </a:solidFill>
+                        <a:effectLst/>
+                        <a:latin typeface="+mn-lt"/>
+                        <a:ea typeface="+mn-ea"/>
+                        <a:cs typeface="+mn-cs"/>
+                      </a:endParaRPr>
+                    </a:p>
+                    <a:p>
+                      <a:pPr marL="285750" indent="-285750">
+                        <a:buFont typeface="Wingdings" panose="05000000000000000000" pitchFamily="2" charset="2"/>
+                        <a:buChar char="Ø"/>
+                      </a:pPr>
+                      <a:endParaRPr lang="en-US" sz="1800" b="0" i="0" kern="1200" dirty="0">
+                        <a:solidFill>
+                          <a:schemeClr val="tx1"/>
+                        </a:solidFill>
+                        <a:effectLst/>
+                        <a:latin typeface="+mn-lt"/>
+                        <a:ea typeface="+mn-ea"/>
+                        <a:cs typeface="+mn-cs"/>
+                      </a:endParaRPr>
+                    </a:p>
+                    <a:p>
+                      <a:pPr marL="285750" indent="-285750">
+                        <a:buFont typeface="Wingdings" panose="05000000000000000000" pitchFamily="2" charset="2"/>
+                        <a:buChar char="Ø"/>
+                      </a:pPr>
+                      <a:r>
+                        <a:rPr lang="en-US" sz="1800" b="0" i="0" kern="1200" dirty="0">
+                          <a:solidFill>
+                            <a:schemeClr val="tx1"/>
+                          </a:solidFill>
+                          <a:effectLst/>
+                          <a:latin typeface="+mn-lt"/>
+                          <a:ea typeface="+mn-ea"/>
+                          <a:cs typeface="+mn-cs"/>
+                        </a:rPr>
+                        <a:t>SQL</a:t>
+                      </a:r>
+                    </a:p>
+                    <a:p>
+                      <a:pPr marL="285750" indent="-285750">
+                        <a:buFont typeface="Wingdings" panose="05000000000000000000" pitchFamily="2" charset="2"/>
+                        <a:buChar char="Ø"/>
+                      </a:pPr>
+                      <a:endParaRPr lang="en-US" sz="1800" b="0" i="0" kern="1200" dirty="0">
+                        <a:solidFill>
+                          <a:schemeClr val="tx1"/>
+                        </a:solidFill>
+                        <a:effectLst/>
+                        <a:latin typeface="+mn-lt"/>
+                        <a:ea typeface="+mn-ea"/>
+                        <a:cs typeface="+mn-cs"/>
+                      </a:endParaRPr>
+                    </a:p>
+                    <a:p>
+                      <a:pPr marL="285750" indent="-285750">
+                        <a:buFont typeface="Wingdings" panose="05000000000000000000" pitchFamily="2" charset="2"/>
+                        <a:buChar char="Ø"/>
+                      </a:pPr>
+                      <a:endParaRPr lang="en-US" sz="1800" b="0" i="0" kern="1200" dirty="0">
+                        <a:solidFill>
+                          <a:schemeClr val="tx1"/>
+                        </a:solidFill>
+                        <a:effectLst/>
+                        <a:latin typeface="+mn-lt"/>
+                        <a:ea typeface="+mn-ea"/>
+                        <a:cs typeface="+mn-cs"/>
+                      </a:endParaRPr>
+                    </a:p>
+                    <a:p>
+                      <a:pPr marL="285750" indent="-285750">
+                        <a:buFont typeface="Wingdings" panose="05000000000000000000" pitchFamily="2" charset="2"/>
+                        <a:buChar char="Ø"/>
+                      </a:pPr>
+                      <a:r>
+                        <a:rPr lang="en-US" sz="1800" b="0" i="0" kern="1200" dirty="0">
+                          <a:solidFill>
+                            <a:schemeClr val="tx1"/>
+                          </a:solidFill>
+                          <a:effectLst/>
+                          <a:latin typeface="+mn-lt"/>
+                          <a:ea typeface="+mn-ea"/>
+                          <a:cs typeface="+mn-cs"/>
+                        </a:rPr>
+                        <a:t>AWS – S3 bucket</a:t>
+                      </a:r>
+                    </a:p>
+                    <a:p>
+                      <a:pPr marL="285750" indent="-285750">
+                        <a:buFont typeface="Wingdings" panose="05000000000000000000" pitchFamily="2" charset="2"/>
+                        <a:buChar char="Ø"/>
+                      </a:pPr>
+                      <a:endParaRPr lang="en-US" sz="1800" b="0" i="0" kern="1200" dirty="0">
+                        <a:solidFill>
+                          <a:schemeClr val="tx1"/>
+                        </a:solidFill>
+                        <a:effectLst/>
+                        <a:latin typeface="+mn-lt"/>
+                        <a:ea typeface="+mn-ea"/>
+                        <a:cs typeface="+mn-cs"/>
+                      </a:endParaRPr>
+                    </a:p>
+                    <a:p>
+                      <a:pPr marL="285750" indent="-285750">
+                        <a:buFont typeface="Wingdings" panose="05000000000000000000" pitchFamily="2" charset="2"/>
+                        <a:buChar char="Ø"/>
+                      </a:pPr>
+                      <a:endParaRPr lang="en-US" sz="1800" b="0" i="0" kern="1200" dirty="0">
+                        <a:solidFill>
+                          <a:schemeClr val="tx1"/>
+                        </a:solidFill>
+                        <a:effectLst/>
+                        <a:latin typeface="+mn-lt"/>
+                        <a:ea typeface="+mn-ea"/>
+                        <a:cs typeface="+mn-cs"/>
+                      </a:endParaRPr>
+                    </a:p>
+                    <a:p>
+                      <a:pPr marL="285750" indent="-285750">
+                        <a:buFont typeface="Wingdings" panose="05000000000000000000" pitchFamily="2" charset="2"/>
+                        <a:buChar char="Ø"/>
+                      </a:pPr>
+                      <a:r>
+                        <a:rPr lang="en-US" sz="1800" b="0" i="0" kern="1200" dirty="0">
+                          <a:solidFill>
+                            <a:schemeClr val="tx1"/>
+                          </a:solidFill>
+                          <a:effectLst/>
+                          <a:latin typeface="+mn-lt"/>
+                          <a:ea typeface="+mn-ea"/>
+                          <a:cs typeface="+mn-cs"/>
+                        </a:rPr>
+                        <a:t>Tableau</a:t>
+                      </a:r>
+                    </a:p>
+                    <a:p>
+                      <a:pPr marL="285750" indent="-285750">
+                        <a:buFont typeface="Wingdings" panose="05000000000000000000" pitchFamily="2" charset="2"/>
+                        <a:buChar char="Ø"/>
+                      </a:pPr>
+                      <a:endParaRPr lang="en-US" sz="1800" b="0" i="0" kern="1200" dirty="0">
+                        <a:solidFill>
+                          <a:schemeClr val="tx1"/>
+                        </a:solidFill>
+                        <a:effectLst/>
+                        <a:latin typeface="+mn-lt"/>
+                        <a:ea typeface="+mn-ea"/>
+                        <a:cs typeface="+mn-cs"/>
+                      </a:endParaRPr>
+                    </a:p>
+                    <a:p>
+                      <a:pPr marL="285750" indent="-285750">
+                        <a:buFont typeface="Wingdings" panose="05000000000000000000" pitchFamily="2" charset="2"/>
+                        <a:buChar char="Ø"/>
+                      </a:pPr>
+                      <a:endParaRPr lang="en-US" sz="1400" cap="none" spc="0" dirty="0">
+                        <a:solidFill>
+                          <a:schemeClr val="tx1"/>
+                        </a:solidFill>
+                      </a:endParaRPr>
+                    </a:p>
+                  </a:txBody>
+                  <a:tcPr marL="151061" marR="151061" marT="151061" marB="151061">
+                    <a:lnL w="12700" cmpd="sng">
+                      <a:noFill/>
+                      <a:prstDash val="solid"/>
+                    </a:lnL>
+                    <a:lnR w="12700" cmpd="sng">
+                      <a:noFill/>
+                      <a:prstDash val="solid"/>
+                    </a:lnR>
+                    <a:lnT w="38100" cmpd="sng">
+                      <a:noFill/>
+                    </a:lnT>
+                    <a:lnB w="12700" cmpd="sng">
+                      <a:noFill/>
+                      <a:prstDash val="solid"/>
+                    </a:lnB>
+                    <a:noFill/>
+                  </a:tcPr>
+                </a:tc>
+                <a:extLst>
+                  <a:ext uri="{0D108BD9-81ED-4DB2-BD59-A6C34878D82A}">
+                    <a16:rowId xmlns:a16="http://schemas.microsoft.com/office/drawing/2014/main" val="2085369860"/>
+                  </a:ext>
+                </a:extLst>
+              </a:tr>
+              <a:tr h="505683">
+                <a:tc>
+                  <a:txBody>
+                    <a:bodyPr/>
+                    <a:lstStyle/>
+                    <a:p>
+                      <a:pPr marL="0" marR="0" lvl="0" indent="0" algn="l" defTabSz="914400" rtl="0" eaLnBrk="1" fontAlgn="auto" latinLnBrk="0" hangingPunct="1">
+                        <a:lnSpc>
+                          <a:spcPct val="100000"/>
+                        </a:lnSpc>
+                        <a:spcBef>
+                          <a:spcPts val="0"/>
+                        </a:spcBef>
+                        <a:spcAft>
+                          <a:spcPts val="0"/>
+                        </a:spcAft>
+                        <a:buClrTx/>
+                        <a:buSzTx/>
+                        <a:buFontTx/>
+                        <a:buNone/>
+                        <a:tabLst/>
+                        <a:defRPr/>
+                      </a:pPr>
+                      <a:endParaRPr lang="en-US" sz="1800" cap="none" spc="0" dirty="0">
+                        <a:solidFill>
+                          <a:schemeClr val="tx1"/>
+                        </a:solidFill>
+                      </a:endParaRPr>
+                    </a:p>
+                  </a:txBody>
+                  <a:tcPr marL="151061" marR="151061" marT="151061" marB="151061">
+                    <a:lnL w="12700" cmpd="sng">
+                      <a:noFill/>
+                      <a:prstDash val="solid"/>
+                    </a:lnL>
+                    <a:lnR w="12700" cmpd="sng">
+                      <a:noFill/>
+                      <a:prstDash val="solid"/>
+                    </a:lnR>
+                    <a:lnT w="12700" cmpd="sng">
+                      <a:noFill/>
+                      <a:prstDash val="solid"/>
+                    </a:lnT>
+                    <a:lnB w="12700" cmpd="sng">
+                      <a:noFill/>
+                      <a:prstDash val="solid"/>
+                    </a:lnB>
+                    <a:noFill/>
+                  </a:tcPr>
+                </a:tc>
+                <a:extLst>
+                  <a:ext uri="{0D108BD9-81ED-4DB2-BD59-A6C34878D82A}">
+                    <a16:rowId xmlns:a16="http://schemas.microsoft.com/office/drawing/2014/main" val="2578144993"/>
+                  </a:ext>
+                </a:extLst>
+              </a:tr>
+            </a:tbl>
+          </a:graphicData>
+        </a:graphic>
+      </p:graphicFrame>
+      <p:pic>
+        <p:nvPicPr>
+          <p:cNvPr id="5" name="Picture 4" descr="Logo, company name&#10;&#10;Description automatically generated">
+            <a:extLst>
+              <a:ext uri="{FF2B5EF4-FFF2-40B4-BE49-F238E27FC236}">
+                <a16:creationId xmlns:a16="http://schemas.microsoft.com/office/drawing/2014/main" id="{7B60DE3E-D5E1-39D2-90E7-38338CF1529A}"/>
+              </a:ext>
+            </a:extLst>
+          </p:cNvPr>
+          <p:cNvPicPr>
+            <a:picLocks noChangeAspect="1"/>
+          </p:cNvPicPr>
+          <p:nvPr/>
+        </p:nvPicPr>
+        <p:blipFill>
+          <a:blip r:embed="rId3"/>
+          <a:stretch>
+            <a:fillRect/>
+          </a:stretch>
+        </p:blipFill>
+        <p:spPr>
+          <a:xfrm>
+            <a:off x="2524418" y="3242386"/>
+            <a:ext cx="4035001" cy="1506895"/>
+          </a:xfrm>
+          <a:prstGeom prst="rect">
+            <a:avLst/>
+          </a:prstGeom>
+        </p:spPr>
+      </p:pic>
+      <p:pic>
+        <p:nvPicPr>
+          <p:cNvPr id="7" name="Picture 6" descr="Icon&#10;&#10;Description automatically generated">
+            <a:extLst>
+              <a:ext uri="{FF2B5EF4-FFF2-40B4-BE49-F238E27FC236}">
+                <a16:creationId xmlns:a16="http://schemas.microsoft.com/office/drawing/2014/main" id="{8970CAD0-2828-CEAE-6697-0960C352DEC6}"/>
+              </a:ext>
+            </a:extLst>
+          </p:cNvPr>
+          <p:cNvPicPr>
+            <a:picLocks noChangeAspect="1"/>
+          </p:cNvPicPr>
+          <p:nvPr/>
+        </p:nvPicPr>
+        <p:blipFill>
+          <a:blip r:embed="rId4"/>
+          <a:stretch>
+            <a:fillRect/>
+          </a:stretch>
+        </p:blipFill>
+        <p:spPr>
+          <a:xfrm>
+            <a:off x="6438900" y="3844535"/>
+            <a:ext cx="2798406" cy="1588828"/>
+          </a:xfrm>
+          <a:prstGeom prst="rect">
+            <a:avLst/>
+          </a:prstGeom>
+        </p:spPr>
+      </p:pic>
+      <p:pic>
+        <p:nvPicPr>
+          <p:cNvPr id="11" name="Picture 10" descr="Logo, company name&#10;&#10;Description automatically generated">
+            <a:extLst>
+              <a:ext uri="{FF2B5EF4-FFF2-40B4-BE49-F238E27FC236}">
+                <a16:creationId xmlns:a16="http://schemas.microsoft.com/office/drawing/2014/main" id="{F861951B-AC66-629F-1E24-B8B11C830AAC}"/>
+              </a:ext>
+            </a:extLst>
+          </p:cNvPr>
+          <p:cNvPicPr>
+            <a:picLocks noChangeAspect="1"/>
+          </p:cNvPicPr>
+          <p:nvPr/>
+        </p:nvPicPr>
+        <p:blipFill>
+          <a:blip r:embed="rId5"/>
+          <a:stretch>
+            <a:fillRect/>
+          </a:stretch>
+        </p:blipFill>
+        <p:spPr>
+          <a:xfrm>
+            <a:off x="2799184" y="5101199"/>
+            <a:ext cx="3909527" cy="917045"/>
+          </a:xfrm>
+          <a:prstGeom prst="rect">
+            <a:avLst/>
+          </a:prstGeom>
+        </p:spPr>
+      </p:pic>
+      <p:pic>
+        <p:nvPicPr>
+          <p:cNvPr id="13" name="Picture 12" descr="A picture containing text, clipart, vector graphics&#10;&#10;Description automatically generated">
+            <a:extLst>
+              <a:ext uri="{FF2B5EF4-FFF2-40B4-BE49-F238E27FC236}">
+                <a16:creationId xmlns:a16="http://schemas.microsoft.com/office/drawing/2014/main" id="{4F8712DD-5759-95C3-435E-A90DC5E99685}"/>
+              </a:ext>
+            </a:extLst>
+          </p:cNvPr>
+          <p:cNvPicPr>
+            <a:picLocks noChangeAspect="1"/>
+          </p:cNvPicPr>
+          <p:nvPr/>
+        </p:nvPicPr>
+        <p:blipFill>
+          <a:blip r:embed="rId6"/>
+          <a:stretch>
+            <a:fillRect/>
+          </a:stretch>
+        </p:blipFill>
+        <p:spPr>
+          <a:xfrm>
+            <a:off x="8754059" y="3641795"/>
+            <a:ext cx="3188736" cy="2214971"/>
+          </a:xfrm>
+          <a:prstGeom prst="rect">
+            <a:avLst/>
+          </a:prstGeom>
+        </p:spPr>
+      </p:pic>
+    </p:spTree>
+    <p:extLst>
+      <p:ext uri="{BB962C8B-B14F-4D97-AF65-F5344CB8AC3E}">
+        <p14:creationId xmlns:p14="http://schemas.microsoft.com/office/powerpoint/2010/main" val="990965214"/>
+      </p:ext>
+    </p:extLst>
+  </p:cSld>
+  <p:clrMapOvr>
+    <a:masterClrMapping/>
+  </p:clrMapOvr>
+</p:sld>
+</file>
+
+<file path=ppt/slides/slide5.xml><?xml version="1.0" encoding="utf-8"?>
+<p:sld xmlns:a="http://schemas.openxmlformats.org/drawingml/2006/main" xmlns:r="http://schemas.openxmlformats.org/officeDocument/2006/relationships" xmlns:p="http://schemas.openxmlformats.org/presentationml/2006/main">
+  <p:cSld>
+    <p:bg>
+      <p:bgPr>
+        <a:solidFill>
+          <a:schemeClr val="bg1"/>
+        </a:solidFill>
+        <a:effectLst/>
+      </p:bgPr>
+    </p:bg>
+    <p:spTree>
+      <p:nvGrpSpPr>
+        <p:cNvPr id="1" name=""/>
+        <p:cNvGrpSpPr/>
+        <p:nvPr/>
+      </p:nvGrpSpPr>
+      <p:grpSpPr>
+        <a:xfrm>
+          <a:off x="0" y="0"/>
+          <a:ext cx="0" cy="0"/>
+          <a:chOff x="0" y="0"/>
+          <a:chExt cx="0" cy="0"/>
+        </a:xfrm>
+      </p:grpSpPr>
+      <p:sp>
+        <p:nvSpPr>
+          <p:cNvPr id="2" name="Title 1">
+            <a:extLst>
+              <a:ext uri="{FF2B5EF4-FFF2-40B4-BE49-F238E27FC236}">
+                <a16:creationId xmlns:a16="http://schemas.microsoft.com/office/drawing/2014/main" id="{75AC86D3-8FD1-4F47-A319-7D0542E48B2F}"/>
+              </a:ext>
+            </a:extLst>
+          </p:cNvPr>
+          <p:cNvSpPr>
+            <a:spLocks noGrp="1"/>
+          </p:cNvSpPr>
+          <p:nvPr>
+            <p:ph type="title"/>
+          </p:nvPr>
+        </p:nvSpPr>
+        <p:spPr>
+          <a:xfrm>
+            <a:off x="223934" y="367849"/>
+            <a:ext cx="10058400" cy="917045"/>
+          </a:xfrm>
+        </p:spPr>
+        <p:txBody>
+          <a:bodyPr vert="horz" lIns="91440" tIns="45720" rIns="91440" bIns="45720" rtlCol="0">
+            <a:normAutofit/>
+          </a:bodyPr>
+          <a:lstStyle/>
+          <a:p>
+            <a:r>
+              <a:rPr lang="en-US" dirty="0"/>
+              <a:t>Data Exploration</a:t>
+            </a:r>
+          </a:p>
+        </p:txBody>
+      </p:sp>
+      <p:graphicFrame>
+        <p:nvGraphicFramePr>
+          <p:cNvPr id="4" name="Table 4">
+            <a:extLst>
+              <a:ext uri="{FF2B5EF4-FFF2-40B4-BE49-F238E27FC236}">
+                <a16:creationId xmlns:a16="http://schemas.microsoft.com/office/drawing/2014/main" id="{C266CDD0-3E96-40BD-8324-62D1DD86152D}"/>
+              </a:ext>
+            </a:extLst>
+          </p:cNvPr>
+          <p:cNvGraphicFramePr>
+            <a:graphicFrameLocks noGrp="1"/>
+          </p:cNvGraphicFramePr>
+          <p:nvPr>
+            <p:ph idx="1"/>
+            <p:extLst>
+              <p:ext uri="{D42A27DB-BD31-4B8C-83A1-F6EECF244321}">
+                <p14:modId xmlns:p14="http://schemas.microsoft.com/office/powerpoint/2010/main" val="4944942"/>
+              </p:ext>
+            </p:extLst>
+          </p:nvPr>
+        </p:nvGraphicFramePr>
+        <p:xfrm>
+          <a:off x="223934" y="1284894"/>
+          <a:ext cx="11756571" cy="5112606"/>
         </p:xfrm>
         <a:graphic>
           <a:graphicData uri="http://schemas.openxmlformats.org/drawingml/2006/table">
@@ -4869,6 +5468,39 @@
                       </a:r>
                     </a:p>
                     <a:p>
+                      <a:endParaRPr lang="en-US" sz="1800" b="0" i="0" kern="1200" cap="none" spc="0" dirty="0">
+                        <a:solidFill>
+                          <a:schemeClr val="tx1"/>
+                        </a:solidFill>
+                        <a:effectLst/>
+                        <a:latin typeface="+mn-lt"/>
+                        <a:ea typeface="+mn-ea"/>
+                        <a:cs typeface="+mn-cs"/>
+                      </a:endParaRPr>
+                    </a:p>
+                    <a:p>
+                      <a:pPr marL="285750" indent="-285750">
+                        <a:buFont typeface="Wingdings" panose="05000000000000000000" pitchFamily="2" charset="2"/>
+                        <a:buChar char="Ø"/>
+                      </a:pPr>
+                      <a:r>
+                        <a:rPr lang="en-US" sz="1800" b="0" i="0" kern="1200" cap="none" spc="0" dirty="0">
+                          <a:solidFill>
+                            <a:schemeClr val="tx1"/>
+                          </a:solidFill>
+                          <a:effectLst/>
+                          <a:latin typeface="+mn-lt"/>
+                          <a:ea typeface="+mn-ea"/>
+                          <a:cs typeface="+mn-cs"/>
+                        </a:rPr>
+                        <a:t>The dataset shape was </a:t>
+                      </a:r>
+                    </a:p>
+                    <a:p>
+                      <a:pPr marL="285750" indent="-285750">
+                        <a:buFont typeface="Wingdings" panose="05000000000000000000" pitchFamily="2" charset="2"/>
+                        <a:buChar char="Ø"/>
+                      </a:pPr>
                       <a:endParaRPr lang="en-US" sz="1800" b="0" i="0" kern="1200" cap="none" spc="0" dirty="0">
                         <a:solidFill>
                           <a:schemeClr val="tx1"/>
@@ -4984,7 +5616,7 @@
                           <a:ea typeface="+mn-ea"/>
                           <a:cs typeface="+mn-cs"/>
                         </a:rPr>
-                        <a:t>Approximately 20 columns had excessive null values.</a:t>
+                        <a:t>Approximately 20 columns had excessive null values. </a:t>
                       </a:r>
                     </a:p>
                     <a:p>
@@ -5144,10 +5776,111 @@
           </a:graphicData>
         </a:graphic>
       </p:graphicFrame>
+      <p:pic>
+        <p:nvPicPr>
+          <p:cNvPr id="5" name="Picture 4">
+            <a:extLst>
+              <a:ext uri="{FF2B5EF4-FFF2-40B4-BE49-F238E27FC236}">
+                <a16:creationId xmlns:a16="http://schemas.microsoft.com/office/drawing/2014/main" id="{49D8309C-D446-5205-1F7E-93B24AEAB0C2}"/>
+              </a:ext>
+            </a:extLst>
+          </p:cNvPr>
+          <p:cNvPicPr>
+            <a:picLocks noChangeAspect="1"/>
+          </p:cNvPicPr>
+          <p:nvPr/>
+        </p:nvPicPr>
+        <p:blipFill>
+          <a:blip r:embed="rId3"/>
+          <a:stretch>
+            <a:fillRect/>
+          </a:stretch>
+        </p:blipFill>
+        <p:spPr>
+          <a:xfrm>
+            <a:off x="2962880" y="2437277"/>
+            <a:ext cx="2560842" cy="669817"/>
+          </a:xfrm>
+          <a:prstGeom prst="rect">
+            <a:avLst/>
+          </a:prstGeom>
+        </p:spPr>
+      </p:pic>
+      <p:pic>
+        <p:nvPicPr>
+          <p:cNvPr id="7" name="Picture 6">
+            <a:extLst>
+              <a:ext uri="{FF2B5EF4-FFF2-40B4-BE49-F238E27FC236}">
+                <a16:creationId xmlns:a16="http://schemas.microsoft.com/office/drawing/2014/main" id="{6393C4AE-7107-D3C0-6C8A-AEB575FC1C3B}"/>
+              </a:ext>
+            </a:extLst>
+          </p:cNvPr>
+          <p:cNvPicPr>
+            <a:picLocks noChangeAspect="1"/>
+          </p:cNvPicPr>
+          <p:nvPr/>
+        </p:nvPicPr>
+        <p:blipFill>
+          <a:blip r:embed="rId4"/>
+          <a:stretch>
+            <a:fillRect/>
+          </a:stretch>
+        </p:blipFill>
+        <p:spPr>
+          <a:xfrm>
+            <a:off x="7634005" y="2997656"/>
+            <a:ext cx="4346500" cy="1687082"/>
+          </a:xfrm>
+          <a:prstGeom prst="rect">
+            <a:avLst/>
+          </a:prstGeom>
+        </p:spPr>
+      </p:pic>
+      <p:cxnSp>
+        <p:nvCxnSpPr>
+          <p:cNvPr id="9" name="Straight Arrow Connector 8">
+            <a:extLst>
+              <a:ext uri="{FF2B5EF4-FFF2-40B4-BE49-F238E27FC236}">
+                <a16:creationId xmlns:a16="http://schemas.microsoft.com/office/drawing/2014/main" id="{DAC4C19F-2C3C-4AB3-9BCD-3A0303BAD04F}"/>
+              </a:ext>
+            </a:extLst>
+          </p:cNvPr>
+          <p:cNvCxnSpPr>
+            <a:cxnSpLocks/>
+          </p:cNvCxnSpPr>
+          <p:nvPr/>
+        </p:nvCxnSpPr>
+        <p:spPr>
+          <a:xfrm flipV="1">
+            <a:off x="5943600" y="4012163"/>
+            <a:ext cx="1690405" cy="447870"/>
+          </a:xfrm>
+          <a:prstGeom prst="straightConnector1">
+            <a:avLst/>
+          </a:prstGeom>
+          <a:ln w="50800">
+            <a:tailEnd type="triangle"/>
+          </a:ln>
+        </p:spPr>
+        <p:style>
+          <a:lnRef idx="1">
+            <a:schemeClr val="accent1"/>
+          </a:lnRef>
+          <a:fillRef idx="0">
+            <a:schemeClr val="accent1"/>
+          </a:fillRef>
+          <a:effectRef idx="0">
+            <a:schemeClr val="accent1"/>
+          </a:effectRef>
+          <a:fontRef idx="minor">
+            <a:schemeClr val="tx1"/>
+          </a:fontRef>
+        </p:style>
+      </p:cxnSp>
     </p:spTree>
     <p:extLst>
       <p:ext uri="{BB962C8B-B14F-4D97-AF65-F5344CB8AC3E}">
-        <p14:creationId xmlns:p14="http://schemas.microsoft.com/office/powerpoint/2010/main" val="990965214"/>
+        <p14:creationId xmlns:p14="http://schemas.microsoft.com/office/powerpoint/2010/main" val="1494598166"/>
       </p:ext>
     </p:extLst>
   </p:cSld>
@@ -5157,7 +5890,7 @@
 </p:sld>
 </file>
 
-<file path=ppt/slides/slide5.xml><?xml version="1.0" encoding="utf-8"?>
+<file path=ppt/slides/slide6.xml><?xml version="1.0" encoding="utf-8"?>
 <p:sld xmlns:a="http://schemas.openxmlformats.org/drawingml/2006/main" xmlns:r="http://schemas.openxmlformats.org/officeDocument/2006/relationships" xmlns:p="http://schemas.openxmlformats.org/presentationml/2006/main">
   <p:cSld>
     <p:bg>
@@ -5664,7 +6397,7 @@
 </p:sld>
 </file>
 
-<file path=ppt/slides/slide6.xml><?xml version="1.0" encoding="utf-8"?>
+<file path=ppt/slides/slide7.xml><?xml version="1.0" encoding="utf-8"?>
 <p:sld xmlns:a="http://schemas.openxmlformats.org/drawingml/2006/main" xmlns:r="http://schemas.openxmlformats.org/officeDocument/2006/relationships" xmlns:p="http://schemas.openxmlformats.org/presentationml/2006/main">
   <p:cSld>
     <p:bg>
@@ -6624,6 +7357,49 @@
 </a:themeOverride>
 </file>
 
+<file path=ppt/theme/themeOverride6.xml><?xml version="1.0" encoding="utf-8"?>
+<a:themeOverride xmlns:a="http://schemas.openxmlformats.org/drawingml/2006/main">
+  <a:clrScheme name="Parcel">
+    <a:dk1>
+      <a:srgbClr val="000000"/>
+    </a:dk1>
+    <a:lt1>
+      <a:srgbClr val="FFFFFF"/>
+    </a:lt1>
+    <a:dk2>
+      <a:srgbClr val="4A5356"/>
+    </a:dk2>
+    <a:lt2>
+      <a:srgbClr val="E8E3CE"/>
+    </a:lt2>
+    <a:accent1>
+      <a:srgbClr val="F6A21D"/>
+    </a:accent1>
+    <a:accent2>
+      <a:srgbClr val="9BAFB5"/>
+    </a:accent2>
+    <a:accent3>
+      <a:srgbClr val="C96731"/>
+    </a:accent3>
+    <a:accent4>
+      <a:srgbClr val="9CA383"/>
+    </a:accent4>
+    <a:accent5>
+      <a:srgbClr val="87795D"/>
+    </a:accent5>
+    <a:accent6>
+      <a:srgbClr val="A0988C"/>
+    </a:accent6>
+    <a:hlink>
+      <a:srgbClr val="00B0F0"/>
+    </a:hlink>
+    <a:folHlink>
+      <a:srgbClr val="738F97"/>
+    </a:folHlink>
+  </a:clrScheme>
+</a:themeOverride>
+</file>
+
 <file path=customXml/item1.xml><?xml version="1.0" encoding="utf-8"?>
 <p:properties xmlns:p="http://schemas.microsoft.com/office/2006/metadata/properties" xmlns:xsi="http://www.w3.org/2001/XMLSchema-instance" xmlns:pc="http://schemas.microsoft.com/office/infopath/2007/PartnerControls">
   <documentManagement>
@@ -6634,6 +7410,15 @@
 </file>
 
 <file path=customXml/item2.xml><?xml version="1.0" encoding="utf-8"?>
+<?mso-contentType ?>
+<FormTemplates xmlns="http://schemas.microsoft.com/sharepoint/v3/contenttype/forms">
+  <Display>DocumentLibraryForm</Display>
+  <Edit>DocumentLibraryForm</Edit>
+  <New>DocumentLibraryForm</New>
+</FormTemplates>
+</file>
+
+<file path=customXml/item3.xml><?xml version="1.0" encoding="utf-8"?>
 <ct:contentTypeSchema xmlns:ct="http://schemas.microsoft.com/office/2006/metadata/contentType" xmlns:ma="http://schemas.microsoft.com/office/2006/metadata/properties/metaAttributes" ct:_="" ma:_="" ma:contentTypeName="Document" ma:contentTypeID="0x01010079F111ED35F8CC479449609E8A0923A6" ma:contentTypeVersion="12" ma:contentTypeDescription="Create a new document." ma:contentTypeScope="" ma:versionID="a410dd7f93c95333ffa1b60ed6adedd1">
   <xsd:schema xmlns:xsd="http://www.w3.org/2001/XMLSchema" xmlns:xs="http://www.w3.org/2001/XMLSchema" xmlns:p="http://schemas.microsoft.com/office/2006/metadata/properties" xmlns:ns2="71af3243-3dd4-4a8d-8c0d-dd76da1f02a5" xmlns:ns3="16c05727-aa75-4e4a-9b5f-8a80a1165891" targetNamespace="http://schemas.microsoft.com/office/2006/metadata/properties" ma:root="true" ma:fieldsID="a936d9baba76aa3866493feff160faab" ns2:_="" ns3:_="">
     <xsd:import namespace="71af3243-3dd4-4a8d-8c0d-dd76da1f02a5"/>
@@ -6854,15 +7639,6 @@
 </ct:contentTypeSchema>
 </file>
 
-<file path=customXml/item3.xml><?xml version="1.0" encoding="utf-8"?>
-<?mso-contentType ?>
-<FormTemplates xmlns="http://schemas.microsoft.com/sharepoint/v3/contenttype/forms">
-  <Display>DocumentLibraryForm</Display>
-  <Edit>DocumentLibraryForm</Edit>
-  <New>DocumentLibraryForm</New>
-</FormTemplates>
-</file>
-
 <file path=customXml/itemProps1.xml><?xml version="1.0" encoding="utf-8"?>
 <ds:datastoreItem xmlns:ds="http://schemas.openxmlformats.org/officeDocument/2006/customXml" ds:itemID="{A03EEFF0-FB57-4CB4-8BFC-DF397689E2ED}">
   <ds:schemaRefs>
@@ -6874,6 +7650,14 @@
 </file>
 
 <file path=customXml/itemProps2.xml><?xml version="1.0" encoding="utf-8"?>
+<ds:datastoreItem xmlns:ds="http://schemas.openxmlformats.org/officeDocument/2006/customXml" ds:itemID="{AA3F7EDC-E5B4-4BBC-9D2A-CBE6D46C37AD}">
+  <ds:schemaRefs>
+    <ds:schemaRef ds:uri="http://schemas.microsoft.com/sharepoint/v3/contenttype/forms"/>
+  </ds:schemaRefs>
+</ds:datastoreItem>
+</file>
+
+<file path=customXml/itemProps3.xml><?xml version="1.0" encoding="utf-8"?>
 <ds:datastoreItem xmlns:ds="http://schemas.openxmlformats.org/officeDocument/2006/customXml" ds:itemID="{93932EF5-314F-409E-8020-FEE5FA0795B9}">
   <ds:schemaRefs>
     <ds:schemaRef ds:uri="http://schemas.microsoft.com/office/2006/metadata/contentType"/>
@@ -6890,12 +7674,4 @@
     <ds:schemaRef ds:uri="http://schemas.microsoft.com/internal/obd"/>
   </ds:schemaRefs>
 </ds:datastoreItem>
-</file>
-
-<file path=customXml/itemProps3.xml><?xml version="1.0" encoding="utf-8"?>
-<ds:datastoreItem xmlns:ds="http://schemas.openxmlformats.org/officeDocument/2006/customXml" ds:itemID="{AA3F7EDC-E5B4-4BBC-9D2A-CBE6D46C37AD}">
-  <ds:schemaRefs>
-    <ds:schemaRef ds:uri="http://schemas.microsoft.com/sharepoint/v3/contenttype/forms"/>
-  </ds:schemaRefs>
-</ds:datastoreItem>
 </file>
</xml_diff>